<commit_message>
Update the pres y0
</commit_message>
<xml_diff>
--- a/Do It Tomorrow.pptx
+++ b/Do It Tomorrow.pptx
@@ -10,7 +10,8 @@
     <p:sldId id="258" r:id="rId4"/>
     <p:sldId id="259" r:id="rId5"/>
     <p:sldId id="261" r:id="rId6"/>
-    <p:sldId id="260" r:id="rId7"/>
+    <p:sldId id="262" r:id="rId7"/>
+    <p:sldId id="260" r:id="rId8"/>
   </p:sldIdLst>
   <p:sldSz cx="9144000" cy="6858000" type="screen4x3"/>
   <p:notesSz cx="6858000" cy="9144000"/>
@@ -183,7 +184,7 @@
           <a:p>
             <a:fld id="{DF57DDA0-8FF7-4CCD-8133-7626DA3C636B}" type="datetimeFigureOut">
               <a:rPr lang="en-IE" smtClean="0"/>
-              <a:t>01/02/2013</a:t>
+              <a:t>06/02/2013</a:t>
             </a:fld>
             <a:endParaRPr lang="en-IE"/>
           </a:p>
@@ -708,7 +709,7 @@
           <a:p>
             <a:fld id="{DF57DDA0-8FF7-4CCD-8133-7626DA3C636B}" type="datetimeFigureOut">
               <a:rPr lang="en-IE" smtClean="0"/>
-              <a:t>01/02/2013</a:t>
+              <a:t>06/02/2013</a:t>
             </a:fld>
             <a:endParaRPr lang="en-IE"/>
           </a:p>
@@ -1022,7 +1023,7 @@
           <a:p>
             <a:fld id="{DF57DDA0-8FF7-4CCD-8133-7626DA3C636B}" type="datetimeFigureOut">
               <a:rPr lang="en-IE" smtClean="0"/>
-              <a:t>01/02/2013</a:t>
+              <a:t>06/02/2013</a:t>
             </a:fld>
             <a:endParaRPr lang="en-IE"/>
           </a:p>
@@ -1308,7 +1309,7 @@
           <a:p>
             <a:fld id="{DF57DDA0-8FF7-4CCD-8133-7626DA3C636B}" type="datetimeFigureOut">
               <a:rPr lang="en-IE" smtClean="0"/>
-              <a:t>01/02/2013</a:t>
+              <a:t>06/02/2013</a:t>
             </a:fld>
             <a:endParaRPr lang="en-IE"/>
           </a:p>
@@ -1883,7 +1884,7 @@
           <a:p>
             <a:fld id="{DF57DDA0-8FF7-4CCD-8133-7626DA3C636B}" type="datetimeFigureOut">
               <a:rPr lang="en-IE" smtClean="0"/>
-              <a:t>01/02/2013</a:t>
+              <a:t>06/02/2013</a:t>
             </a:fld>
             <a:endParaRPr lang="en-IE"/>
           </a:p>
@@ -1973,7 +1974,7 @@
           <a:p>
             <a:fld id="{DF57DDA0-8FF7-4CCD-8133-7626DA3C636B}" type="datetimeFigureOut">
               <a:rPr lang="en-IE" smtClean="0"/>
-              <a:t>01/02/2013</a:t>
+              <a:t>06/02/2013</a:t>
             </a:fld>
             <a:endParaRPr lang="en-IE"/>
           </a:p>
@@ -2682,7 +2683,7 @@
           <a:p>
             <a:fld id="{DF57DDA0-8FF7-4CCD-8133-7626DA3C636B}" type="datetimeFigureOut">
               <a:rPr lang="en-IE" smtClean="0"/>
-              <a:t>01/02/2013</a:t>
+              <a:t>06/02/2013</a:t>
             </a:fld>
             <a:endParaRPr lang="en-IE"/>
           </a:p>
@@ -2934,7 +2935,7 @@
           <a:p>
             <a:fld id="{DF57DDA0-8FF7-4CCD-8133-7626DA3C636B}" type="datetimeFigureOut">
               <a:rPr lang="en-IE" smtClean="0"/>
-              <a:t>01/02/2013</a:t>
+              <a:t>06/02/2013</a:t>
             </a:fld>
             <a:endParaRPr lang="en-IE"/>
           </a:p>
@@ -3163,7 +3164,7 @@
           <a:p>
             <a:fld id="{DF57DDA0-8FF7-4CCD-8133-7626DA3C636B}" type="datetimeFigureOut">
               <a:rPr lang="en-IE" smtClean="0"/>
-              <a:t>01/02/2013</a:t>
+              <a:t>06/02/2013</a:t>
             </a:fld>
             <a:endParaRPr lang="en-IE"/>
           </a:p>
@@ -3437,7 +3438,7 @@
           <a:p>
             <a:fld id="{DF57DDA0-8FF7-4CCD-8133-7626DA3C636B}" type="datetimeFigureOut">
               <a:rPr lang="en-IE" smtClean="0"/>
-              <a:t>01/02/2013</a:t>
+              <a:t>06/02/2013</a:t>
             </a:fld>
             <a:endParaRPr lang="en-IE"/>
           </a:p>
@@ -3723,7 +3724,7 @@
           <a:p>
             <a:fld id="{DF57DDA0-8FF7-4CCD-8133-7626DA3C636B}" type="datetimeFigureOut">
               <a:rPr lang="en-IE" smtClean="0"/>
-              <a:t>01/02/2013</a:t>
+              <a:t>06/02/2013</a:t>
             </a:fld>
             <a:endParaRPr lang="en-IE"/>
           </a:p>
@@ -3991,7 +3992,7 @@
           <a:p>
             <a:fld id="{DF57DDA0-8FF7-4CCD-8133-7626DA3C636B}" type="datetimeFigureOut">
               <a:rPr lang="en-IE" smtClean="0"/>
-              <a:t>01/02/2013</a:t>
+              <a:t>06/02/2013</a:t>
             </a:fld>
             <a:endParaRPr lang="en-IE"/>
           </a:p>
@@ -4849,7 +4850,6 @@
               <a:rPr lang="en-IE" dirty="0" smtClean="0"/>
               <a:t>Daniel was lead programmer for the same game(collision detection, movement, etc.).</a:t>
             </a:r>
-            <a:endParaRPr lang="en-IE" dirty="0" smtClean="0"/>
           </a:p>
           <a:p>
             <a:r>
@@ -5001,20 +5001,35 @@
           <a:p>
             <a:r>
               <a:rPr lang="en-IE" dirty="0" smtClean="0"/>
-              <a:t>The main project we want to do is “Tank”</a:t>
-            </a:r>
-          </a:p>
-          <a:p>
+              <a:t>The main project we want to do is “Tank</a:t>
+            </a:r>
             <a:r>
               <a:rPr lang="en-IE" dirty="0" smtClean="0"/>
-              <a:t>The reason we have chosen these is because we all have experience with the XNA framework, a framework used to make games</a:t>
-            </a:r>
+              <a:t>”.</a:t>
+            </a:r>
+            <a:endParaRPr lang="en-IE" dirty="0" smtClean="0"/>
           </a:p>
           <a:p>
             <a:r>
               <a:rPr lang="en-IE" dirty="0" smtClean="0"/>
-              <a:t>We are also considering entering a competition which centres around the “Tank” theme</a:t>
-            </a:r>
+              <a:t>The reason we have chosen these is because we all have experience with the XNA framework, a framework used to make </a:t>
+            </a:r>
+            <a:r>
+              <a:rPr lang="en-IE" dirty="0" smtClean="0"/>
+              <a:t>games.</a:t>
+            </a:r>
+            <a:endParaRPr lang="en-IE" dirty="0" smtClean="0"/>
+          </a:p>
+          <a:p>
+            <a:r>
+              <a:rPr lang="en-IE" dirty="0" smtClean="0"/>
+              <a:t>We are also considering entering a competition which centres around the “Tank” </a:t>
+            </a:r>
+            <a:r>
+              <a:rPr lang="en-IE" dirty="0" smtClean="0"/>
+              <a:t>theme.</a:t>
+            </a:r>
+            <a:endParaRPr lang="en-IE" dirty="0" smtClean="0"/>
           </a:p>
         </p:txBody>
       </p:sp>
@@ -5161,6 +5176,117 @@
 </file>
 
 <file path=ppt/slides/slide6.xml><?xml version="1.0" encoding="utf-8"?>
+<p:sld xmlns:a="http://schemas.openxmlformats.org/drawingml/2006/main" xmlns:r="http://schemas.openxmlformats.org/officeDocument/2006/relationships" xmlns:p="http://schemas.openxmlformats.org/presentationml/2006/main">
+  <p:cSld>
+    <p:spTree>
+      <p:nvGrpSpPr>
+        <p:cNvPr id="1" name=""/>
+        <p:cNvGrpSpPr/>
+        <p:nvPr/>
+      </p:nvGrpSpPr>
+      <p:grpSpPr>
+        <a:xfrm>
+          <a:off x="0" y="0"/>
+          <a:ext cx="0" cy="0"/>
+          <a:chOff x="0" y="0"/>
+          <a:chExt cx="0" cy="0"/>
+        </a:xfrm>
+      </p:grpSpPr>
+      <p:sp>
+        <p:nvSpPr>
+          <p:cNvPr id="2" name="Content Placeholder 1"/>
+          <p:cNvSpPr>
+            <a:spLocks noGrp="1"/>
+          </p:cNvSpPr>
+          <p:nvPr>
+            <p:ph idx="1"/>
+          </p:nvPr>
+        </p:nvSpPr>
+        <p:spPr/>
+        <p:txBody>
+          <a:bodyPr>
+            <a:normAutofit lnSpcReduction="10000"/>
+          </a:bodyPr>
+          <a:lstStyle/>
+          <a:p>
+            <a:endParaRPr lang="en-IE" dirty="0" smtClean="0"/>
+          </a:p>
+          <a:p>
+            <a:r>
+              <a:rPr lang="en-IE" dirty="0" smtClean="0"/>
+              <a:t>For 3D renders, we will be using blender as it is open-source and works with the XNA framework.</a:t>
+            </a:r>
+          </a:p>
+          <a:p>
+            <a:r>
+              <a:rPr lang="en-IE" dirty="0" smtClean="0"/>
+              <a:t>One of our goals is to enter Games </a:t>
+            </a:r>
+            <a:r>
+              <a:rPr lang="en-IE" dirty="0" err="1" smtClean="0"/>
+              <a:t>Fleadh</a:t>
+            </a:r>
+            <a:r>
+              <a:rPr lang="en-IE" dirty="0" smtClean="0"/>
+              <a:t> with the game.</a:t>
+            </a:r>
+          </a:p>
+          <a:p>
+            <a:r>
+              <a:rPr lang="en-IE" dirty="0" smtClean="0"/>
+              <a:t>We have lead roles, but other group members can be of help as we all have experience with the area such as sounds design.</a:t>
+            </a:r>
+          </a:p>
+          <a:p>
+            <a:r>
+              <a:rPr lang="en-IE" dirty="0" smtClean="0"/>
+              <a:t>We all plan on testing the product and giving feedback to the lead programmer.</a:t>
+            </a:r>
+            <a:endParaRPr lang="en-IE" dirty="0"/>
+          </a:p>
+        </p:txBody>
+      </p:sp>
+      <p:sp>
+        <p:nvSpPr>
+          <p:cNvPr id="3" name="Title 2"/>
+          <p:cNvSpPr>
+            <a:spLocks noGrp="1"/>
+          </p:cNvSpPr>
+          <p:nvPr>
+            <p:ph type="title"/>
+          </p:nvPr>
+        </p:nvSpPr>
+        <p:spPr/>
+        <p:txBody>
+          <a:bodyPr/>
+          <a:lstStyle/>
+          <a:p>
+            <a:r>
+              <a:rPr lang="en-IE" dirty="0" smtClean="0"/>
+              <a:t>Our </a:t>
+            </a:r>
+            <a:r>
+              <a:rPr lang="en-IE" smtClean="0"/>
+              <a:t>approach cont..</a:t>
+            </a:r>
+            <a:endParaRPr lang="en-IE" dirty="0"/>
+          </a:p>
+        </p:txBody>
+      </p:sp>
+    </p:spTree>
+    <p:extLst>
+      <p:ext uri="{BB962C8B-B14F-4D97-AF65-F5344CB8AC3E}">
+        <p14:creationId xmlns:p14="http://schemas.microsoft.com/office/powerpoint/2010/main" val="3573657779"/>
+      </p:ext>
+    </p:extLst>
+  </p:cSld>
+  <p:clrMapOvr>
+    <a:masterClrMapping/>
+  </p:clrMapOvr>
+</p:sld>
+</file>
+
+<file path=ppt/slides/slide7.xml><?xml version="1.0" encoding="utf-8"?>
 <p:sld xmlns:a="http://schemas.openxmlformats.org/drawingml/2006/main" xmlns:r="http://schemas.openxmlformats.org/officeDocument/2006/relationships" xmlns:p="http://schemas.openxmlformats.org/presentationml/2006/main">
   <p:cSld>
     <p:spTree>

</xml_diff>